<commit_message>
Features:	Dharma Items User Shipping Address Handling Files: (Directory DharmaItems) 	./Data_ER.pptx 	./DharmaItems.js 	./DharmaItemsDBtbls.sql 	./DharmaItems_DBfuncs.php 	Templates/.htaccess 	Templates/shippingInfoForm.tpl 	./ajax-DharmaItemsDB.php 	./index.php 	../master.css
</commit_message>
<xml_diff>
--- a/DharmaItems/Data_ER.pptx
+++ b/DharmaItems/Data_ER.pptx
@@ -260,7 +260,7 @@
           <a:p>
             <a:fld id="{09099BF4-A9EA-864F-B9D7-86FFAD7515BE}" type="datetimeFigureOut">
               <a:rPr lang="en-US" smtClean="0"/>
-              <a:t>7/21/20</a:t>
+              <a:t>1/28/21</a:t>
             </a:fld>
             <a:endParaRPr lang="en-US"/>
           </a:p>
@@ -458,7 +458,7 @@
           <a:p>
             <a:fld id="{09099BF4-A9EA-864F-B9D7-86FFAD7515BE}" type="datetimeFigureOut">
               <a:rPr lang="en-US" smtClean="0"/>
-              <a:t>7/21/20</a:t>
+              <a:t>1/28/21</a:t>
             </a:fld>
             <a:endParaRPr lang="en-US"/>
           </a:p>
@@ -666,7 +666,7 @@
           <a:p>
             <a:fld id="{09099BF4-A9EA-864F-B9D7-86FFAD7515BE}" type="datetimeFigureOut">
               <a:rPr lang="en-US" smtClean="0"/>
-              <a:t>7/21/20</a:t>
+              <a:t>1/28/21</a:t>
             </a:fld>
             <a:endParaRPr lang="en-US"/>
           </a:p>
@@ -864,7 +864,7 @@
           <a:p>
             <a:fld id="{09099BF4-A9EA-864F-B9D7-86FFAD7515BE}" type="datetimeFigureOut">
               <a:rPr lang="en-US" smtClean="0"/>
-              <a:t>7/21/20</a:t>
+              <a:t>1/28/21</a:t>
             </a:fld>
             <a:endParaRPr lang="en-US"/>
           </a:p>
@@ -1139,7 +1139,7 @@
           <a:p>
             <a:fld id="{09099BF4-A9EA-864F-B9D7-86FFAD7515BE}" type="datetimeFigureOut">
               <a:rPr lang="en-US" smtClean="0"/>
-              <a:t>7/21/20</a:t>
+              <a:t>1/28/21</a:t>
             </a:fld>
             <a:endParaRPr lang="en-US"/>
           </a:p>
@@ -1404,7 +1404,7 @@
           <a:p>
             <a:fld id="{09099BF4-A9EA-864F-B9D7-86FFAD7515BE}" type="datetimeFigureOut">
               <a:rPr lang="en-US" smtClean="0"/>
-              <a:t>7/21/20</a:t>
+              <a:t>1/28/21</a:t>
             </a:fld>
             <a:endParaRPr lang="en-US"/>
           </a:p>
@@ -1816,7 +1816,7 @@
           <a:p>
             <a:fld id="{09099BF4-A9EA-864F-B9D7-86FFAD7515BE}" type="datetimeFigureOut">
               <a:rPr lang="en-US" smtClean="0"/>
-              <a:t>7/21/20</a:t>
+              <a:t>1/28/21</a:t>
             </a:fld>
             <a:endParaRPr lang="en-US"/>
           </a:p>
@@ -1957,7 +1957,7 @@
           <a:p>
             <a:fld id="{09099BF4-A9EA-864F-B9D7-86FFAD7515BE}" type="datetimeFigureOut">
               <a:rPr lang="en-US" smtClean="0"/>
-              <a:t>7/21/20</a:t>
+              <a:t>1/28/21</a:t>
             </a:fld>
             <a:endParaRPr lang="en-US"/>
           </a:p>
@@ -2070,7 +2070,7 @@
           <a:p>
             <a:fld id="{09099BF4-A9EA-864F-B9D7-86FFAD7515BE}" type="datetimeFigureOut">
               <a:rPr lang="en-US" smtClean="0"/>
-              <a:t>7/21/20</a:t>
+              <a:t>1/28/21</a:t>
             </a:fld>
             <a:endParaRPr lang="en-US"/>
           </a:p>
@@ -2381,7 +2381,7 @@
           <a:p>
             <a:fld id="{09099BF4-A9EA-864F-B9D7-86FFAD7515BE}" type="datetimeFigureOut">
               <a:rPr lang="en-US" smtClean="0"/>
-              <a:t>7/21/20</a:t>
+              <a:t>1/28/21</a:t>
             </a:fld>
             <a:endParaRPr lang="en-US"/>
           </a:p>
@@ -2669,7 +2669,7 @@
           <a:p>
             <a:fld id="{09099BF4-A9EA-864F-B9D7-86FFAD7515BE}" type="datetimeFigureOut">
               <a:rPr lang="en-US" smtClean="0"/>
-              <a:t>7/21/20</a:t>
+              <a:t>1/28/21</a:t>
             </a:fld>
             <a:endParaRPr lang="en-US"/>
           </a:p>
@@ -2910,7 +2910,7 @@
           <a:p>
             <a:fld id="{09099BF4-A9EA-864F-B9D7-86FFAD7515BE}" type="datetimeFigureOut">
               <a:rPr lang="en-US" smtClean="0"/>
-              <a:t>7/21/20</a:t>
+              <a:t>1/28/21</a:t>
             </a:fld>
             <a:endParaRPr lang="en-US"/>
           </a:p>
@@ -3393,7 +3393,7 @@
           <a:p>
             <a:r>
               <a:rPr lang="en-US" dirty="0"/>
-              <a:t>In addition, the </a:t>
+              <a:t>Additionally, in the </a:t>
             </a:r>
             <a:r>
               <a:rPr lang="en-US" dirty="0" err="1"/>
@@ -3401,7 +3401,7 @@
             </a:r>
             <a:r>
               <a:rPr lang="en-US" dirty="0"/>
-              <a:t> table shall be expanded to add an attribute indicating the primary address, i.e., foreign key to the </a:t>
+              <a:t>, a column will will be added to point to the Primary </a:t>
             </a:r>
             <a:r>
               <a:rPr lang="en-US" dirty="0" err="1"/>
@@ -3409,8 +3409,25 @@
             </a:r>
             <a:r>
               <a:rPr lang="en-US" dirty="0"/>
-              <a:t> table.</a:t>
-            </a:r>
+              <a:t> – A foreign key to </a:t>
+            </a:r>
+            <a:r>
+              <a:rPr lang="en-US" dirty="0" err="1"/>
+              <a:t>UsrAddr</a:t>
+            </a:r>
+            <a:r>
+              <a:rPr lang="en-US" dirty="0"/>
+              <a:t>, Set to null upon DELETE (of the </a:t>
+            </a:r>
+            <a:r>
+              <a:rPr lang="en-US" dirty="0" err="1"/>
+              <a:t>UsrAddr</a:t>
+            </a:r>
+            <a:r>
+              <a:rPr lang="en-US"/>
+              <a:t> tuple);</a:t>
+            </a:r>
+            <a:endParaRPr lang="en-US" dirty="0"/>
           </a:p>
         </p:txBody>
       </p:sp>
@@ -4238,7 +4255,7 @@
         <p:spPr>
           <a:xfrm>
             <a:off x="4743450" y="692150"/>
-            <a:ext cx="2705100" cy="1600200"/>
+            <a:ext cx="3371850" cy="1600200"/>
           </a:xfrm>
           <a:prstGeom prst="rect">
             <a:avLst/>
@@ -4313,6 +4330,12 @@
             <a:r>
               <a:rPr lang="en-US" dirty="0"/>
               <a:t>, (foreign key)</a:t>
+            </a:r>
+          </a:p>
+          <a:p>
+            <a:r>
+              <a:rPr lang="en-US" dirty="0"/>
+              <a:t>  Comment, (txt field – admin use)</a:t>
             </a:r>
           </a:p>
           <a:p>

</xml_diff>

<commit_message>
Features:	Quick & Dirty book items upload function Files:
</commit_message>
<xml_diff>
--- a/DharmaItems/Data_ER.pptx
+++ b/DharmaItems/Data_ER.pptx
@@ -260,7 +260,7 @@
           <a:p>
             <a:fld id="{09099BF4-A9EA-864F-B9D7-86FFAD7515BE}" type="datetimeFigureOut">
               <a:rPr lang="en-US" smtClean="0"/>
-              <a:t>1/28/21</a:t>
+              <a:t>2/12/21</a:t>
             </a:fld>
             <a:endParaRPr lang="en-US"/>
           </a:p>
@@ -458,7 +458,7 @@
           <a:p>
             <a:fld id="{09099BF4-A9EA-864F-B9D7-86FFAD7515BE}" type="datetimeFigureOut">
               <a:rPr lang="en-US" smtClean="0"/>
-              <a:t>1/28/21</a:t>
+              <a:t>2/12/21</a:t>
             </a:fld>
             <a:endParaRPr lang="en-US"/>
           </a:p>
@@ -666,7 +666,7 @@
           <a:p>
             <a:fld id="{09099BF4-A9EA-864F-B9D7-86FFAD7515BE}" type="datetimeFigureOut">
               <a:rPr lang="en-US" smtClean="0"/>
-              <a:t>1/28/21</a:t>
+              <a:t>2/12/21</a:t>
             </a:fld>
             <a:endParaRPr lang="en-US"/>
           </a:p>
@@ -864,7 +864,7 @@
           <a:p>
             <a:fld id="{09099BF4-A9EA-864F-B9D7-86FFAD7515BE}" type="datetimeFigureOut">
               <a:rPr lang="en-US" smtClean="0"/>
-              <a:t>1/28/21</a:t>
+              <a:t>2/12/21</a:t>
             </a:fld>
             <a:endParaRPr lang="en-US"/>
           </a:p>
@@ -1139,7 +1139,7 @@
           <a:p>
             <a:fld id="{09099BF4-A9EA-864F-B9D7-86FFAD7515BE}" type="datetimeFigureOut">
               <a:rPr lang="en-US" smtClean="0"/>
-              <a:t>1/28/21</a:t>
+              <a:t>2/12/21</a:t>
             </a:fld>
             <a:endParaRPr lang="en-US"/>
           </a:p>
@@ -1404,7 +1404,7 @@
           <a:p>
             <a:fld id="{09099BF4-A9EA-864F-B9D7-86FFAD7515BE}" type="datetimeFigureOut">
               <a:rPr lang="en-US" smtClean="0"/>
-              <a:t>1/28/21</a:t>
+              <a:t>2/12/21</a:t>
             </a:fld>
             <a:endParaRPr lang="en-US"/>
           </a:p>
@@ -1816,7 +1816,7 @@
           <a:p>
             <a:fld id="{09099BF4-A9EA-864F-B9D7-86FFAD7515BE}" type="datetimeFigureOut">
               <a:rPr lang="en-US" smtClean="0"/>
-              <a:t>1/28/21</a:t>
+              <a:t>2/12/21</a:t>
             </a:fld>
             <a:endParaRPr lang="en-US"/>
           </a:p>
@@ -1957,7 +1957,7 @@
           <a:p>
             <a:fld id="{09099BF4-A9EA-864F-B9D7-86FFAD7515BE}" type="datetimeFigureOut">
               <a:rPr lang="en-US" smtClean="0"/>
-              <a:t>1/28/21</a:t>
+              <a:t>2/12/21</a:t>
             </a:fld>
             <a:endParaRPr lang="en-US"/>
           </a:p>
@@ -2070,7 +2070,7 @@
           <a:p>
             <a:fld id="{09099BF4-A9EA-864F-B9D7-86FFAD7515BE}" type="datetimeFigureOut">
               <a:rPr lang="en-US" smtClean="0"/>
-              <a:t>1/28/21</a:t>
+              <a:t>2/12/21</a:t>
             </a:fld>
             <a:endParaRPr lang="en-US"/>
           </a:p>
@@ -2381,7 +2381,7 @@
           <a:p>
             <a:fld id="{09099BF4-A9EA-864F-B9D7-86FFAD7515BE}" type="datetimeFigureOut">
               <a:rPr lang="en-US" smtClean="0"/>
-              <a:t>1/28/21</a:t>
+              <a:t>2/12/21</a:t>
             </a:fld>
             <a:endParaRPr lang="en-US"/>
           </a:p>
@@ -2669,7 +2669,7 @@
           <a:p>
             <a:fld id="{09099BF4-A9EA-864F-B9D7-86FFAD7515BE}" type="datetimeFigureOut">
               <a:rPr lang="en-US" smtClean="0"/>
-              <a:t>1/28/21</a:t>
+              <a:t>2/12/21</a:t>
             </a:fld>
             <a:endParaRPr lang="en-US"/>
           </a:p>
@@ -2910,7 +2910,7 @@
           <a:p>
             <a:fld id="{09099BF4-A9EA-864F-B9D7-86FFAD7515BE}" type="datetimeFigureOut">
               <a:rPr lang="en-US" smtClean="0"/>
-              <a:t>1/28/21</a:t>
+              <a:t>2/12/21</a:t>
             </a:fld>
             <a:endParaRPr lang="en-US"/>
           </a:p>
@@ -4108,7 +4108,7 @@
         <p:spPr>
           <a:xfrm>
             <a:off x="368300" y="381000"/>
-            <a:ext cx="2705100" cy="2222500"/>
+            <a:ext cx="2997200" cy="2413000"/>
           </a:xfrm>
           <a:prstGeom prst="rect">
             <a:avLst/>
@@ -4136,7 +4136,7 @@
           <a:p>
             <a:r>
               <a:rPr lang="en-US" dirty="0" err="1"/>
-              <a:t>DI_rq</a:t>
+              <a:t>DIreq</a:t>
             </a:r>
             <a:r>
               <a:rPr lang="en-US" dirty="0"/>
@@ -4150,7 +4150,7 @@
             </a:r>
             <a:r>
               <a:rPr lang="en-US" dirty="0" err="1"/>
-              <a:t>DI_rqID</a:t>
+              <a:t>DIreqID</a:t>
             </a:r>
             <a:r>
               <a:rPr lang="en-US" dirty="0"/>
@@ -4164,7 +4164,7 @@
             </a:r>
             <a:r>
               <a:rPr lang="en-US" dirty="0" err="1"/>
-              <a:t>UsrID</a:t>
+              <a:t>UsrName</a:t>
             </a:r>
             <a:r>
               <a:rPr lang="en-US" dirty="0"/>
@@ -4200,7 +4200,15 @@
             </a:r>
             <a:r>
               <a:rPr lang="en-US" dirty="0" err="1"/>
-              <a:t>Date_Rcvd</a:t>
+              <a:t>Date</a:t>
+            </a:r>
+            <a:r>
+              <a:rPr lang="en-US" err="1"/>
+              <a:t>_</a:t>
+            </a:r>
+            <a:r>
+              <a:rPr lang="en-US"/>
+              <a:t>Reqd</a:t>
             </a:r>
             <a:r>
               <a:rPr lang="en-US" dirty="0"/>
@@ -4230,7 +4238,16 @@
               <a:rPr lang="en-US" dirty="0" err="1"/>
               <a:t>Who_Processed</a:t>
             </a:r>
-            <a:endParaRPr lang="en-US" dirty="0"/>
+            <a:r>
+              <a:rPr lang="en-US" dirty="0"/>
+              <a:t>,</a:t>
+            </a:r>
+          </a:p>
+          <a:p>
+            <a:r>
+              <a:rPr lang="en-US" dirty="0"/>
+              <a:t>  Comment, (txt – admin use)</a:t>
+            </a:r>
           </a:p>
           <a:p>
             <a:r>
@@ -4283,7 +4300,7 @@
           <a:p>
             <a:r>
               <a:rPr lang="en-US" dirty="0" err="1"/>
-              <a:t>DI_rqItem</a:t>
+              <a:t>DIreqItem</a:t>
             </a:r>
             <a:r>
               <a:rPr lang="en-US" dirty="0"/>
@@ -4297,7 +4314,21 @@
             </a:r>
             <a:r>
               <a:rPr lang="en-US" dirty="0" err="1"/>
-              <a:t>InventoryTbl</a:t>
+              <a:t>tblName</a:t>
+            </a:r>
+            <a:r>
+              <a:rPr lang="en-US" dirty="0"/>
+              <a:t>, (Foreign key)</a:t>
+            </a:r>
+          </a:p>
+          <a:p>
+            <a:r>
+              <a:rPr lang="en-US" dirty="0"/>
+              <a:t>  </a:t>
+            </a:r>
+            <a:r>
+              <a:rPr lang="en-US" dirty="0" err="1"/>
+              <a:t>invtID</a:t>
             </a:r>
             <a:r>
               <a:rPr lang="en-US" dirty="0"/>
@@ -4311,21 +4342,7 @@
             </a:r>
             <a:r>
               <a:rPr lang="en-US" dirty="0" err="1"/>
-              <a:t>InventoryID</a:t>
-            </a:r>
-            <a:r>
-              <a:rPr lang="en-US" dirty="0"/>
-              <a:t>, (key)</a:t>
-            </a:r>
-          </a:p>
-          <a:p>
-            <a:r>
-              <a:rPr lang="en-US" dirty="0"/>
-              <a:t>  </a:t>
-            </a:r>
-            <a:r>
-              <a:rPr lang="en-US" dirty="0" err="1"/>
-              <a:t>DI_rqID</a:t>
+              <a:t>DI_reqID</a:t>
             </a:r>
             <a:r>
               <a:rPr lang="en-US" dirty="0"/>
@@ -4363,9 +4380,9 @@
           <p:nvPr/>
         </p:nvCxnSpPr>
         <p:spPr>
-          <a:xfrm>
-            <a:off x="3073400" y="1492250"/>
-            <a:ext cx="1670050" cy="0"/>
+          <a:xfrm flipV="1">
+            <a:off x="3365500" y="1492250"/>
+            <a:ext cx="1377950" cy="95250"/>
           </a:xfrm>
           <a:prstGeom prst="straightConnector1">
             <a:avLst/>
@@ -4537,22 +4554,18 @@
           <a:lstStyle/>
           <a:p>
             <a:r>
+              <a:rPr lang="en-US" dirty="0"/>
+              <a:t>INVT_A {</a:t>
+            </a:r>
+          </a:p>
+          <a:p>
+            <a:r>
+              <a:rPr lang="en-US" dirty="0"/>
+              <a:t>  </a:t>
+            </a:r>
+            <a:r>
               <a:rPr lang="en-US" dirty="0" err="1"/>
-              <a:t>Inventory_A</a:t>
-            </a:r>
-            <a:r>
-              <a:rPr lang="en-US" dirty="0"/>
-              <a:t> {</a:t>
-            </a:r>
-          </a:p>
-          <a:p>
-            <a:r>
-              <a:rPr lang="en-US" dirty="0"/>
-              <a:t>  </a:t>
-            </a:r>
-            <a:r>
-              <a:rPr lang="en-US" dirty="0" err="1"/>
-              <a:t>InventoryID</a:t>
+              <a:t>invtID</a:t>
             </a:r>
             <a:r>
               <a:rPr lang="en-US" dirty="0"/>
@@ -4621,22 +4634,18 @@
           <a:lstStyle/>
           <a:p>
             <a:r>
+              <a:rPr lang="en-US" dirty="0"/>
+              <a:t>INVT_B {</a:t>
+            </a:r>
+          </a:p>
+          <a:p>
+            <a:r>
+              <a:rPr lang="en-US" dirty="0"/>
+              <a:t>  </a:t>
+            </a:r>
+            <a:r>
               <a:rPr lang="en-US" dirty="0" err="1"/>
-              <a:t>Inventory_B</a:t>
-            </a:r>
-            <a:r>
-              <a:rPr lang="en-US" dirty="0"/>
-              <a:t> {</a:t>
-            </a:r>
-          </a:p>
-          <a:p>
-            <a:r>
-              <a:rPr lang="en-US" dirty="0"/>
-              <a:t>  </a:t>
-            </a:r>
-            <a:r>
-              <a:rPr lang="en-US" dirty="0" err="1"/>
-              <a:t>InventoryID</a:t>
+              <a:t>invtID</a:t>
             </a:r>
             <a:r>
               <a:rPr lang="en-US" dirty="0"/>
@@ -4705,8 +4714,88 @@
           <a:lstStyle/>
           <a:p>
             <a:r>
+              <a:rPr lang="en-US" dirty="0"/>
+              <a:t>INVT_C {</a:t>
+            </a:r>
+          </a:p>
+          <a:p>
+            <a:r>
+              <a:rPr lang="en-US" dirty="0"/>
+              <a:t>  </a:t>
+            </a:r>
+            <a:r>
               <a:rPr lang="en-US" dirty="0" err="1"/>
-              <a:t>Inventory_C</a:t>
+              <a:t>invtID</a:t>
+            </a:r>
+            <a:r>
+              <a:rPr lang="en-US" dirty="0"/>
+              <a:t>, (key)</a:t>
+            </a:r>
+          </a:p>
+          <a:p>
+            <a:r>
+              <a:rPr lang="en-US" dirty="0"/>
+              <a:t>  other fields,</a:t>
+            </a:r>
+          </a:p>
+          <a:p>
+            <a:r>
+              <a:rPr lang="en-US" dirty="0"/>
+              <a:t>  .  .  .</a:t>
+            </a:r>
+          </a:p>
+          <a:p>
+            <a:r>
+              <a:rPr lang="en-US" dirty="0"/>
+              <a:t>} </a:t>
+            </a:r>
+          </a:p>
+        </p:txBody>
+      </p:sp>
+      <p:sp>
+        <p:nvSpPr>
+          <p:cNvPr id="11" name="Rectangle 10">
+            <a:extLst>
+              <a:ext uri="{FF2B5EF4-FFF2-40B4-BE49-F238E27FC236}">
+                <a16:creationId xmlns:a16="http://schemas.microsoft.com/office/drawing/2014/main" id="{9FF53A58-D5B4-7543-9AC0-03618C5FF33A}"/>
+              </a:ext>
+            </a:extLst>
+          </p:cNvPr>
+          <p:cNvSpPr/>
+          <p:nvPr/>
+        </p:nvSpPr>
+        <p:spPr>
+          <a:xfrm>
+            <a:off x="8629650" y="692150"/>
+            <a:ext cx="2705100" cy="1600200"/>
+          </a:xfrm>
+          <a:prstGeom prst="rect">
+            <a:avLst/>
+          </a:prstGeom>
+        </p:spPr>
+        <p:style>
+          <a:lnRef idx="2">
+            <a:schemeClr val="accent1">
+              <a:shade val="50000"/>
+            </a:schemeClr>
+          </a:lnRef>
+          <a:fillRef idx="1">
+            <a:schemeClr val="accent1"/>
+          </a:fillRef>
+          <a:effectRef idx="0">
+            <a:schemeClr val="accent1"/>
+          </a:effectRef>
+          <a:fontRef idx="minor">
+            <a:schemeClr val="lt1"/>
+          </a:fontRef>
+        </p:style>
+        <p:txBody>
+          <a:bodyPr rtlCol="0" anchor="ctr"/>
+          <a:lstStyle/>
+          <a:p>
+            <a:r>
+              <a:rPr lang="en-US" dirty="0" err="1"/>
+              <a:t>INVT_Type</a:t>
             </a:r>
             <a:r>
               <a:rPr lang="en-US" dirty="0"/>
@@ -4720,7 +4809,7 @@
             </a:r>
             <a:r>
               <a:rPr lang="en-US" dirty="0" err="1"/>
-              <a:t>InventoryID</a:t>
+              <a:t>invtTblName</a:t>
             </a:r>
             <a:r>
               <a:rPr lang="en-US" dirty="0"/>
@@ -4730,7 +4819,7 @@
           <a:p>
             <a:r>
               <a:rPr lang="en-US" dirty="0"/>
-              <a:t>  other fields,</a:t>
+              <a:t>  other fields??,</a:t>
             </a:r>
           </a:p>
           <a:p>

</xml_diff>

<commit_message>
Features:	Implement MySQL Tables for Dhrama Items Requests Files: 	modified:   DB_Tables/DharmaItemsDBtbls.sql 	modified:   DharmaItems/Data_ER.pptx
</commit_message>
<xml_diff>
--- a/DharmaItems/Data_ER.pptx
+++ b/DharmaItems/Data_ER.pptx
@@ -260,7 +260,7 @@
           <a:p>
             <a:fld id="{09099BF4-A9EA-864F-B9D7-86FFAD7515BE}" type="datetimeFigureOut">
               <a:rPr lang="en-US" smtClean="0"/>
-              <a:t>2/12/21</a:t>
+              <a:t>6/4/21</a:t>
             </a:fld>
             <a:endParaRPr lang="en-US"/>
           </a:p>
@@ -458,7 +458,7 @@
           <a:p>
             <a:fld id="{09099BF4-A9EA-864F-B9D7-86FFAD7515BE}" type="datetimeFigureOut">
               <a:rPr lang="en-US" smtClean="0"/>
-              <a:t>2/12/21</a:t>
+              <a:t>6/4/21</a:t>
             </a:fld>
             <a:endParaRPr lang="en-US"/>
           </a:p>
@@ -666,7 +666,7 @@
           <a:p>
             <a:fld id="{09099BF4-A9EA-864F-B9D7-86FFAD7515BE}" type="datetimeFigureOut">
               <a:rPr lang="en-US" smtClean="0"/>
-              <a:t>2/12/21</a:t>
+              <a:t>6/4/21</a:t>
             </a:fld>
             <a:endParaRPr lang="en-US"/>
           </a:p>
@@ -864,7 +864,7 @@
           <a:p>
             <a:fld id="{09099BF4-A9EA-864F-B9D7-86FFAD7515BE}" type="datetimeFigureOut">
               <a:rPr lang="en-US" smtClean="0"/>
-              <a:t>2/12/21</a:t>
+              <a:t>6/4/21</a:t>
             </a:fld>
             <a:endParaRPr lang="en-US"/>
           </a:p>
@@ -1139,7 +1139,7 @@
           <a:p>
             <a:fld id="{09099BF4-A9EA-864F-B9D7-86FFAD7515BE}" type="datetimeFigureOut">
               <a:rPr lang="en-US" smtClean="0"/>
-              <a:t>2/12/21</a:t>
+              <a:t>6/4/21</a:t>
             </a:fld>
             <a:endParaRPr lang="en-US"/>
           </a:p>
@@ -1404,7 +1404,7 @@
           <a:p>
             <a:fld id="{09099BF4-A9EA-864F-B9D7-86FFAD7515BE}" type="datetimeFigureOut">
               <a:rPr lang="en-US" smtClean="0"/>
-              <a:t>2/12/21</a:t>
+              <a:t>6/4/21</a:t>
             </a:fld>
             <a:endParaRPr lang="en-US"/>
           </a:p>
@@ -1816,7 +1816,7 @@
           <a:p>
             <a:fld id="{09099BF4-A9EA-864F-B9D7-86FFAD7515BE}" type="datetimeFigureOut">
               <a:rPr lang="en-US" smtClean="0"/>
-              <a:t>2/12/21</a:t>
+              <a:t>6/4/21</a:t>
             </a:fld>
             <a:endParaRPr lang="en-US"/>
           </a:p>
@@ -1957,7 +1957,7 @@
           <a:p>
             <a:fld id="{09099BF4-A9EA-864F-B9D7-86FFAD7515BE}" type="datetimeFigureOut">
               <a:rPr lang="en-US" smtClean="0"/>
-              <a:t>2/12/21</a:t>
+              <a:t>6/4/21</a:t>
             </a:fld>
             <a:endParaRPr lang="en-US"/>
           </a:p>
@@ -2070,7 +2070,7 @@
           <a:p>
             <a:fld id="{09099BF4-A9EA-864F-B9D7-86FFAD7515BE}" type="datetimeFigureOut">
               <a:rPr lang="en-US" smtClean="0"/>
-              <a:t>2/12/21</a:t>
+              <a:t>6/4/21</a:t>
             </a:fld>
             <a:endParaRPr lang="en-US"/>
           </a:p>
@@ -2381,7 +2381,7 @@
           <a:p>
             <a:fld id="{09099BF4-A9EA-864F-B9D7-86FFAD7515BE}" type="datetimeFigureOut">
               <a:rPr lang="en-US" smtClean="0"/>
-              <a:t>2/12/21</a:t>
+              <a:t>6/4/21</a:t>
             </a:fld>
             <a:endParaRPr lang="en-US"/>
           </a:p>
@@ -2669,7 +2669,7 @@
           <a:p>
             <a:fld id="{09099BF4-A9EA-864F-B9D7-86FFAD7515BE}" type="datetimeFigureOut">
               <a:rPr lang="en-US" smtClean="0"/>
-              <a:t>2/12/21</a:t>
+              <a:t>6/4/21</a:t>
             </a:fld>
             <a:endParaRPr lang="en-US"/>
           </a:p>
@@ -2910,7 +2910,7 @@
           <a:p>
             <a:fld id="{09099BF4-A9EA-864F-B9D7-86FFAD7515BE}" type="datetimeFigureOut">
               <a:rPr lang="en-US" smtClean="0"/>
-              <a:t>2/12/21</a:t>
+              <a:t>6/4/21</a:t>
             </a:fld>
             <a:endParaRPr lang="en-US"/>
           </a:p>
@@ -4136,7 +4136,7 @@
           <a:p>
             <a:r>
               <a:rPr lang="en-US" dirty="0" err="1"/>
-              <a:t>DIreq</a:t>
+              <a:t>DIrqCart</a:t>
             </a:r>
             <a:r>
               <a:rPr lang="en-US" dirty="0"/>
@@ -4200,15 +4200,7 @@
             </a:r>
             <a:r>
               <a:rPr lang="en-US" dirty="0" err="1"/>
-              <a:t>Date</a:t>
-            </a:r>
-            <a:r>
-              <a:rPr lang="en-US" err="1"/>
-              <a:t>_</a:t>
-            </a:r>
-            <a:r>
-              <a:rPr lang="en-US"/>
-              <a:t>Reqd</a:t>
+              <a:t>Date_Reqd</a:t>
             </a:r>
             <a:r>
               <a:rPr lang="en-US" dirty="0"/>
@@ -4300,7 +4292,7 @@
           <a:p>
             <a:r>
               <a:rPr lang="en-US" dirty="0" err="1"/>
-              <a:t>DIreqItem</a:t>
+              <a:t>DIrqItem</a:t>
             </a:r>
             <a:r>
               <a:rPr lang="en-US" dirty="0"/>

</xml_diff>